<commit_message>
added analysis to powerpoint and updated notebook with comments
</commit_message>
<xml_diff>
--- a/Team_Sphinx_Presentation_20181011.pptx
+++ b/Team_Sphinx_Presentation_20181011.pptx
@@ -238,7 +238,7 @@
           <a:p>
             <a:fld id="{AC8CEC3D-96F7-401F-9673-3EE7F75C9C5B}" type="datetimeFigureOut">
               <a:rPr lang="en-US"/>
-              <a:t>10/9/2018</a:t>
+              <a:t>10/10/2018</a:t>
             </a:fld>
             <a:endParaRPr/>
           </a:p>
@@ -403,7 +403,7 @@
           <a:p>
             <a:fld id="{F032BCF4-D26D-4DAF-9F57-FE1E61FE7935}" type="datetimeFigureOut">
               <a:rPr lang="en-US"/>
-              <a:t>10/9/2018</a:t>
+              <a:t>10/10/2018</a:t>
             </a:fld>
             <a:endParaRPr/>
           </a:p>
@@ -1238,7 +1238,7 @@
             <a:fld id="{81C93FC7-9D1A-468B-98DB-D1E8D74418D9}" type="datetimeFigureOut">
               <a:rPr lang="en-US"/>
               <a:pPr/>
-              <a:t>10/9/2018</a:t>
+              <a:t>10/10/2018</a:t>
             </a:fld>
             <a:endParaRPr/>
           </a:p>
@@ -1440,7 +1440,7 @@
           <a:p>
             <a:fld id="{81C93FC7-9D1A-468B-98DB-D1E8D74418D9}" type="datetimeFigureOut">
               <a:rPr lang="en-US"/>
-              <a:t>10/9/2018</a:t>
+              <a:t>10/10/2018</a:t>
             </a:fld>
             <a:endParaRPr/>
           </a:p>
@@ -1652,7 +1652,7 @@
           <a:p>
             <a:fld id="{81C93FC7-9D1A-468B-98DB-D1E8D74418D9}" type="datetimeFigureOut">
               <a:rPr lang="en-US"/>
-              <a:t>10/9/2018</a:t>
+              <a:t>10/10/2018</a:t>
             </a:fld>
             <a:endParaRPr/>
           </a:p>
@@ -1854,7 +1854,7 @@
           <a:p>
             <a:fld id="{81C93FC7-9D1A-468B-98DB-D1E8D74418D9}" type="datetimeFigureOut">
               <a:rPr lang="en-US"/>
-              <a:t>10/9/2018</a:t>
+              <a:t>10/10/2018</a:t>
             </a:fld>
             <a:endParaRPr/>
           </a:p>
@@ -2121,7 +2121,7 @@
             <a:fld id="{81C93FC7-9D1A-468B-98DB-D1E8D74418D9}" type="datetimeFigureOut">
               <a:rPr lang="en-US"/>
               <a:pPr/>
-              <a:t>10/9/2018</a:t>
+              <a:t>10/10/2018</a:t>
             </a:fld>
             <a:endParaRPr/>
           </a:p>
@@ -2426,7 +2426,7 @@
           <a:p>
             <a:fld id="{81C93FC7-9D1A-468B-98DB-D1E8D74418D9}" type="datetimeFigureOut">
               <a:rPr lang="en-US"/>
-              <a:t>10/9/2018</a:t>
+              <a:t>10/10/2018</a:t>
             </a:fld>
             <a:endParaRPr/>
           </a:p>
@@ -2874,7 +2874,7 @@
           <a:p>
             <a:fld id="{81C93FC7-9D1A-468B-98DB-D1E8D74418D9}" type="datetimeFigureOut">
               <a:rPr lang="en-US"/>
-              <a:t>10/9/2018</a:t>
+              <a:t>10/10/2018</a:t>
             </a:fld>
             <a:endParaRPr/>
           </a:p>
@@ -3008,7 +3008,7 @@
           <a:p>
             <a:fld id="{81C93FC7-9D1A-468B-98DB-D1E8D74418D9}" type="datetimeFigureOut">
               <a:rPr lang="en-US"/>
-              <a:t>10/9/2018</a:t>
+              <a:t>10/10/2018</a:t>
             </a:fld>
             <a:endParaRPr/>
           </a:p>
@@ -3119,7 +3119,7 @@
           <a:p>
             <a:fld id="{81C93FC7-9D1A-468B-98DB-D1E8D74418D9}" type="datetimeFigureOut">
               <a:rPr lang="en-US"/>
-              <a:t>10/9/2018</a:t>
+              <a:t>10/10/2018</a:t>
             </a:fld>
             <a:endParaRPr/>
           </a:p>
@@ -3421,7 +3421,7 @@
           <a:p>
             <a:fld id="{81C93FC7-9D1A-468B-98DB-D1E8D74418D9}" type="datetimeFigureOut">
               <a:rPr lang="en-US"/>
-              <a:t>10/9/2018</a:t>
+              <a:t>10/10/2018</a:t>
             </a:fld>
             <a:endParaRPr/>
           </a:p>
@@ -3711,7 +3711,7 @@
           <a:p>
             <a:fld id="{81C93FC7-9D1A-468B-98DB-D1E8D74418D9}" type="datetimeFigureOut">
               <a:rPr lang="en-US"/>
-              <a:t>10/9/2018</a:t>
+              <a:t>10/10/2018</a:t>
             </a:fld>
             <a:endParaRPr/>
           </a:p>
@@ -3942,7 +3942,7 @@
             <a:fld id="{81C93FC7-9D1A-468B-98DB-D1E8D74418D9}" type="datetimeFigureOut">
               <a:rPr lang="en-US" smtClean="0"/>
               <a:pPr/>
-              <a:t>10/9/2018</a:t>
+              <a:t>10/10/2018</a:t>
             </a:fld>
             <a:endParaRPr lang="en-US" dirty="0"/>
           </a:p>
@@ -4542,17 +4542,18 @@
             <p:ph type="title"/>
           </p:nvPr>
         </p:nvSpPr>
-        <p:spPr/>
+        <p:spPr>
+          <a:xfrm>
+            <a:off x="608012" y="684628"/>
+            <a:ext cx="10971372" cy="1066800"/>
+          </a:xfrm>
+        </p:spPr>
         <p:txBody>
           <a:bodyPr>
             <a:normAutofit/>
           </a:bodyPr>
           <a:lstStyle/>
           <a:p>
-            <a:pPr>
-              <a:buFont typeface="Wingdings" panose="05000000000000000000" pitchFamily="2" charset="2"/>
-              <a:buChar char="§"/>
-            </a:pPr>
             <a:r>
               <a:rPr lang="en-US" dirty="0"/>
               <a:t>How have total amount of donations changed in the last 4 years? </a:t>
@@ -4577,12 +4578,17 @@
             <p:ph idx="1"/>
           </p:nvPr>
         </p:nvSpPr>
-        <p:spPr/>
+        <p:spPr>
+          <a:xfrm>
+            <a:off x="950198" y="1982373"/>
+            <a:ext cx="10287000" cy="4190999"/>
+          </a:xfrm>
+        </p:spPr>
         <p:txBody>
           <a:bodyPr/>
           <a:lstStyle/>
           <a:p>
-            <a:endParaRPr lang="en-US"/>
+            <a:endParaRPr lang="en-US" dirty="0"/>
           </a:p>
         </p:txBody>
       </p:sp>
@@ -4644,7 +4650,12 @@
             <p:ph type="title"/>
           </p:nvPr>
         </p:nvSpPr>
-        <p:spPr/>
+        <p:spPr>
+          <a:xfrm>
+            <a:off x="601735" y="670560"/>
+            <a:ext cx="10971372" cy="1066800"/>
+          </a:xfrm>
+        </p:spPr>
         <p:txBody>
           <a:bodyPr>
             <a:normAutofit/>
@@ -4674,12 +4685,17 @@
             <p:ph idx="1"/>
           </p:nvPr>
         </p:nvSpPr>
-        <p:spPr/>
+        <p:spPr>
+          <a:xfrm>
+            <a:off x="950912" y="1996441"/>
+            <a:ext cx="10287000" cy="4190999"/>
+          </a:xfrm>
+        </p:spPr>
         <p:txBody>
           <a:bodyPr/>
           <a:lstStyle/>
           <a:p>
-            <a:endParaRPr lang="en-US"/>
+            <a:endParaRPr lang="en-US" dirty="0"/>
           </a:p>
         </p:txBody>
       </p:sp>
@@ -4768,36 +4784,77 @@
         <p:spPr>
           <a:xfrm>
             <a:off x="608012" y="533400"/>
-            <a:ext cx="10972801" cy="4572000"/>
+            <a:ext cx="10972801" cy="5029200"/>
           </a:xfrm>
         </p:spPr>
         <p:txBody>
           <a:bodyPr>
-            <a:normAutofit fontScale="92500" lnSpcReduction="20000"/>
+            <a:normAutofit fontScale="85000" lnSpcReduction="20000"/>
           </a:bodyPr>
           <a:lstStyle/>
           <a:p>
             <a:r>
               <a:rPr lang="en-US" dirty="0"/>
-              <a:t>The data was pulled from the Chronicle of Philanthropy, put into four separate csv files and read into the notebook for analysis. It revealed that the top five recent highest earning causes are:</a:t>
-            </a:r>
-          </a:p>
-          <a:p>
+              <a:t>The data was pulled from the Chronicle of Philanthropy website, scraped into csv files and read into the notebook for analysis. It revealed that the top five highest earning causes are:</a:t>
+            </a:r>
+          </a:p>
+          <a:p>
+            <a:pPr lvl="1"/>
             <a:r>
               <a:rPr lang="en-US" dirty="0"/>
-              <a:t>NOTE: 2018 donation numbers will be lower than final numbers as the year has not ended yet.</a:t>
-            </a:r>
-          </a:p>
-          <a:p>
+              <a:t>Colleges and universities </a:t>
+            </a:r>
+          </a:p>
+          <a:p>
+            <a:pPr lvl="1"/>
             <a:r>
               <a:rPr lang="en-US" dirty="0"/>
-              <a:t>Colleges and universities Health Foundations Arts Community foundations</a:t>
-            </a:r>
-          </a:p>
-          <a:p>
+              <a:t>Health </a:t>
+            </a:r>
+          </a:p>
+          <a:p>
+            <a:pPr lvl="1"/>
             <a:r>
               <a:rPr lang="en-US" dirty="0"/>
-              <a:t>Colleges and universities is by far the highest earning cause, with a four year total of over $20 billion. There was also an interesting uptick in the donations to foundations in 2017, with a massive uptick from roughly half a billion in 2016 to 4 billion in 2017 and then a return to about half a billion in 2018. Health also saw an uptick in donations in 2017, growing from 1 to 2 billion from 2016 - 2017.</a:t>
+              <a:t>Foundations </a:t>
+            </a:r>
+          </a:p>
+          <a:p>
+            <a:pPr lvl="1"/>
+            <a:r>
+              <a:rPr lang="en-US" dirty="0"/>
+              <a:t>Arts  </a:t>
+            </a:r>
+          </a:p>
+          <a:p>
+            <a:pPr lvl="1"/>
+            <a:r>
+              <a:rPr lang="en-US" dirty="0"/>
+              <a:t>Community foundations</a:t>
+            </a:r>
+          </a:p>
+          <a:p>
+            <a:r>
+              <a:rPr lang="en-US" dirty="0"/>
+              <a:t>Colleges and universities total – over $20 billion </a:t>
+            </a:r>
+          </a:p>
+          <a:p>
+            <a:r>
+              <a:rPr lang="en-US" dirty="0"/>
+              <a:t>Interesting uptick in donations to foundations in 2017, with a big increase from roughly half a billion in 2016 to 4 billion in 2017 </a:t>
+            </a:r>
+          </a:p>
+          <a:p>
+            <a:r>
+              <a:rPr lang="en-US" dirty="0"/>
+              <a:t>Health also saw an uptick in donations in 2017, growing from 1 to 2 billion from 2016 - 2017.</a:t>
+            </a:r>
+          </a:p>
+          <a:p>
+            <a:r>
+              <a:rPr lang="en-US" dirty="0"/>
+              <a:t>NOTE: 2018 donation numbers are incomplete. </a:t>
             </a:r>
           </a:p>
           <a:p>
@@ -5179,8 +5236,8 @@
         </p:blipFill>
         <p:spPr>
           <a:xfrm>
-            <a:off x="8609012" y="4471458"/>
-            <a:ext cx="3579813" cy="2386542"/>
+            <a:off x="5484812" y="1371600"/>
+            <a:ext cx="5180013" cy="3453342"/>
           </a:xfrm>
           <a:prstGeom prst="rect">
             <a:avLst/>
@@ -5251,7 +5308,7 @@
           <a:p>
             <a:r>
               <a:rPr lang="en-US" dirty="0"/>
-              <a:t>Research Question</a:t>
+              <a:t>Research Questions</a:t>
             </a:r>
           </a:p>
         </p:txBody>
@@ -5283,7 +5340,7 @@
             </a:pPr>
             <a:r>
               <a:rPr lang="en-US" dirty="0"/>
-              <a:t>We chose to analyze information on US charities from 2015 to 2018 for gifts a $1M or more.</a:t>
+              <a:t>We chose to analyze donation information in the US from 2015 to 2018 valued at $1 million or more.</a:t>
             </a:r>
           </a:p>
           <a:p>
@@ -5300,7 +5357,7 @@
             </a:pPr>
             <a:r>
               <a:rPr lang="en-US" dirty="0"/>
-              <a:t>What are the geographic concentrations of where money is going to and where money is coming from for major donations? </a:t>
+              <a:t>What are the geographic concentrations of where money is going to and where money is coming from? </a:t>
             </a:r>
           </a:p>
           <a:p>
@@ -5384,7 +5441,12 @@
             <p:ph type="title"/>
           </p:nvPr>
         </p:nvSpPr>
-        <p:spPr/>
+        <p:spPr>
+          <a:xfrm>
+            <a:off x="379412" y="457200"/>
+            <a:ext cx="10971372" cy="1066800"/>
+          </a:xfrm>
+        </p:spPr>
         <p:txBody>
           <a:bodyPr/>
           <a:lstStyle/>
@@ -5424,8 +5486,8 @@
         </p:blipFill>
         <p:spPr>
           <a:xfrm>
-            <a:off x="950912" y="1066800"/>
-            <a:ext cx="10287000" cy="2571750"/>
+            <a:off x="73025" y="2143125"/>
+            <a:ext cx="12115800" cy="3028950"/>
           </a:xfrm>
           <a:prstGeom prst="rect">
             <a:avLst/>
@@ -5490,7 +5552,12 @@
             <p:ph type="title"/>
           </p:nvPr>
         </p:nvSpPr>
-        <p:spPr/>
+        <p:spPr>
+          <a:xfrm>
+            <a:off x="379412" y="381000"/>
+            <a:ext cx="10971372" cy="1066800"/>
+          </a:xfrm>
+        </p:spPr>
         <p:txBody>
           <a:bodyPr/>
           <a:lstStyle/>
@@ -5530,7 +5597,7 @@
         </p:blipFill>
         <p:spPr>
           <a:xfrm>
-            <a:off x="2589212" y="304800"/>
+            <a:off x="2589212" y="1754945"/>
             <a:ext cx="6724650" cy="4483100"/>
           </a:xfrm>
           <a:prstGeom prst="rect">
@@ -5590,16 +5657,21 @@
             <p:ph type="title"/>
           </p:nvPr>
         </p:nvSpPr>
-        <p:spPr/>
+        <p:spPr>
+          <a:xfrm>
+            <a:off x="379412" y="533401"/>
+            <a:ext cx="10971372" cy="1066800"/>
+          </a:xfrm>
+        </p:spPr>
         <p:txBody>
           <a:bodyPr>
-            <a:normAutofit fontScale="90000"/>
+            <a:normAutofit/>
           </a:bodyPr>
           <a:lstStyle/>
           <a:p>
             <a:r>
               <a:rPr lang="en-US" dirty="0"/>
-              <a:t>What are the geographic concentrations of where money is going to and where money is coming from for major donations? </a:t>
+              <a:t>What are the geographic concentrations of where money is going to? </a:t>
             </a:r>
           </a:p>
         </p:txBody>
@@ -5628,7 +5700,7 @@
         </p:blipFill>
         <p:spPr>
           <a:xfrm>
-            <a:off x="1853932" y="533401"/>
+            <a:off x="1933440" y="2133600"/>
             <a:ext cx="8321943" cy="4081462"/>
           </a:xfrm>
           <a:prstGeom prst="rect">
@@ -5688,16 +5760,21 @@
             <p:ph type="title"/>
           </p:nvPr>
         </p:nvSpPr>
-        <p:spPr/>
+        <p:spPr>
+          <a:xfrm>
+            <a:off x="514714" y="484379"/>
+            <a:ext cx="10971372" cy="1066800"/>
+          </a:xfrm>
+        </p:spPr>
         <p:txBody>
           <a:bodyPr>
-            <a:normAutofit fontScale="90000"/>
+            <a:normAutofit/>
           </a:bodyPr>
           <a:lstStyle/>
           <a:p>
             <a:r>
               <a:rPr lang="en-US" dirty="0"/>
-              <a:t>What are the geographic concentrations of where money is going to and where money is coming from for major donations?  </a:t>
+              <a:t>What are the geographic concentrations of where money is coming from?  </a:t>
             </a:r>
           </a:p>
         </p:txBody>
@@ -5726,7 +5803,7 @@
         </p:blipFill>
         <p:spPr>
           <a:xfrm>
-            <a:off x="1522412" y="685800"/>
+            <a:off x="1522412" y="1981200"/>
             <a:ext cx="8955976" cy="4392421"/>
           </a:xfrm>
           <a:prstGeom prst="rect">
@@ -5786,7 +5863,12 @@
             <p:ph type="title"/>
           </p:nvPr>
         </p:nvSpPr>
-        <p:spPr/>
+        <p:spPr>
+          <a:xfrm>
+            <a:off x="455612" y="317695"/>
+            <a:ext cx="10971372" cy="1066800"/>
+          </a:xfrm>
+        </p:spPr>
         <p:txBody>
           <a:bodyPr>
             <a:normAutofit fontScale="90000"/>
@@ -5825,7 +5907,7 @@
         </p:blipFill>
         <p:spPr>
           <a:xfrm>
-            <a:off x="2284412" y="381000"/>
+            <a:off x="2397998" y="1794803"/>
             <a:ext cx="7086600" cy="4724400"/>
           </a:xfrm>
           <a:prstGeom prst="rect">
@@ -5887,7 +5969,7 @@
         </p:nvSpPr>
         <p:spPr>
           <a:xfrm>
-            <a:off x="912812" y="5132363"/>
+            <a:off x="608725" y="533400"/>
             <a:ext cx="10971372" cy="1066800"/>
           </a:xfrm>
         </p:spPr>
@@ -5929,7 +6011,7 @@
         </p:blipFill>
         <p:spPr>
           <a:xfrm>
-            <a:off x="1117599" y="658837"/>
+            <a:off x="1117598" y="1981200"/>
             <a:ext cx="9953625" cy="4191000"/>
           </a:xfrm>
           <a:prstGeom prst="rect">

</xml_diff>

<commit_message>
Clean up of Presentation
</commit_message>
<xml_diff>
--- a/Team_Sphinx_Presentation_20181011.pptx
+++ b/Team_Sphinx_Presentation_20181011.pptx
@@ -1112,7 +1112,7 @@
           <a:noFill/>
           <a:extLst>
             <a:ext uri="{909E8E84-426E-40dd-AFC4-6F175D3DCCD1}">
-              <a14:hiddenFill xmlns="" xmlns:a14="http://schemas.microsoft.com/office/drawing/2010/main">
+              <a14:hiddenFill xmlns:a14="http://schemas.microsoft.com/office/drawing/2010/main" xmlns="">
                 <a:solidFill>
                   <a:srgbClr val="FFFFFF"/>
                 </a:solidFill>
@@ -1172,7 +1172,7 @@
             </a:ln>
             <a:extLst>
               <a:ext uri="{91240B29-F687-4f45-9708-019B960494DF}">
-                <a14:hiddenLine xmlns="" xmlns:a14="http://schemas.microsoft.com/office/drawing/2010/main" w="9525">
+                <a14:hiddenLine xmlns:a14="http://schemas.microsoft.com/office/drawing/2010/main" xmlns="" w="9525">
                   <a:solidFill>
                     <a:srgbClr val="000000"/>
                   </a:solidFill>
@@ -1262,7 +1262,7 @@
             </a:ln>
             <a:extLst>
               <a:ext uri="{91240B29-F687-4f45-9708-019B960494DF}">
-                <a14:hiddenLine xmlns="" xmlns:a14="http://schemas.microsoft.com/office/drawing/2010/main" w="9525">
+                <a14:hiddenLine xmlns:a14="http://schemas.microsoft.com/office/drawing/2010/main" xmlns="" w="9525">
                   <a:solidFill>
                     <a:srgbClr val="000000"/>
                   </a:solidFill>
@@ -1352,7 +1352,7 @@
             </a:ln>
             <a:extLst>
               <a:ext uri="{91240B29-F687-4f45-9708-019B960494DF}">
-                <a14:hiddenLine xmlns="" xmlns:a14="http://schemas.microsoft.com/office/drawing/2010/main" w="9525">
+                <a14:hiddenLine xmlns:a14="http://schemas.microsoft.com/office/drawing/2010/main" xmlns="" w="9525">
                   <a:solidFill>
                     <a:srgbClr val="000000"/>
                   </a:solidFill>
@@ -1386,7 +1386,7 @@
             </a:ln>
             <a:extLst>
               <a:ext uri="{91240B29-F687-4f45-9708-019B960494DF}">
-                <a14:hiddenLine xmlns="" xmlns:a14="http://schemas.microsoft.com/office/drawing/2010/main" w="9525">
+                <a14:hiddenLine xmlns:a14="http://schemas.microsoft.com/office/drawing/2010/main" xmlns="" w="9525">
                   <a:solidFill>
                     <a:srgbClr val="000000"/>
                   </a:solidFill>
@@ -1476,7 +1476,7 @@
             </a:ln>
             <a:extLst>
               <a:ext uri="{91240B29-F687-4f45-9708-019B960494DF}">
-                <a14:hiddenLine xmlns="" xmlns:a14="http://schemas.microsoft.com/office/drawing/2010/main" w="9525">
+                <a14:hiddenLine xmlns:a14="http://schemas.microsoft.com/office/drawing/2010/main" xmlns="" w="9525">
                   <a:solidFill>
                     <a:srgbClr val="000000"/>
                   </a:solidFill>
@@ -1538,7 +1538,7 @@
             </a:ln>
             <a:extLst>
               <a:ext uri="{91240B29-F687-4f45-9708-019B960494DF}">
-                <a14:hiddenLine xmlns="" xmlns:a14="http://schemas.microsoft.com/office/drawing/2010/main" w="9525">
+                <a14:hiddenLine xmlns:a14="http://schemas.microsoft.com/office/drawing/2010/main" xmlns="" w="9525">
                   <a:solidFill>
                     <a:srgbClr val="000000"/>
                   </a:solidFill>
@@ -1600,7 +1600,7 @@
             </a:ln>
             <a:extLst>
               <a:ext uri="{91240B29-F687-4f45-9708-019B960494DF}">
-                <a14:hiddenLine xmlns="" xmlns:a14="http://schemas.microsoft.com/office/drawing/2010/main" w="9525">
+                <a14:hiddenLine xmlns:a14="http://schemas.microsoft.com/office/drawing/2010/main" xmlns="" w="9525">
                   <a:solidFill>
                     <a:srgbClr val="000000"/>
                   </a:solidFill>
@@ -1690,7 +1690,7 @@
             </a:ln>
             <a:extLst>
               <a:ext uri="{91240B29-F687-4f45-9708-019B960494DF}">
-                <a14:hiddenLine xmlns="" xmlns:a14="http://schemas.microsoft.com/office/drawing/2010/main" w="9525">
+                <a14:hiddenLine xmlns:a14="http://schemas.microsoft.com/office/drawing/2010/main" xmlns="" w="9525">
                   <a:solidFill>
                     <a:srgbClr val="000000"/>
                   </a:solidFill>
@@ -1752,7 +1752,7 @@
             </a:ln>
             <a:extLst>
               <a:ext uri="{91240B29-F687-4f45-9708-019B960494DF}">
-                <a14:hiddenLine xmlns="" xmlns:a14="http://schemas.microsoft.com/office/drawing/2010/main" w="9525">
+                <a14:hiddenLine xmlns:a14="http://schemas.microsoft.com/office/drawing/2010/main" xmlns="" w="9525">
                   <a:solidFill>
                     <a:srgbClr val="000000"/>
                   </a:solidFill>
@@ -1814,7 +1814,7 @@
             </a:ln>
             <a:extLst>
               <a:ext uri="{91240B29-F687-4f45-9708-019B960494DF}">
-                <a14:hiddenLine xmlns="" xmlns:a14="http://schemas.microsoft.com/office/drawing/2010/main" w="9525">
+                <a14:hiddenLine xmlns:a14="http://schemas.microsoft.com/office/drawing/2010/main" xmlns="" w="9525">
                   <a:solidFill>
                     <a:srgbClr val="000000"/>
                   </a:solidFill>
@@ -1904,7 +1904,7 @@
             </a:ln>
             <a:extLst>
               <a:ext uri="{91240B29-F687-4f45-9708-019B960494DF}">
-                <a14:hiddenLine xmlns="" xmlns:a14="http://schemas.microsoft.com/office/drawing/2010/main" w="9525">
+                <a14:hiddenLine xmlns:a14="http://schemas.microsoft.com/office/drawing/2010/main" xmlns="" w="9525">
                   <a:solidFill>
                     <a:srgbClr val="000000"/>
                   </a:solidFill>
@@ -1994,7 +1994,7 @@
             </a:ln>
             <a:extLst>
               <a:ext uri="{91240B29-F687-4f45-9708-019B960494DF}">
-                <a14:hiddenLine xmlns="" xmlns:a14="http://schemas.microsoft.com/office/drawing/2010/main" w="9525">
+                <a14:hiddenLine xmlns:a14="http://schemas.microsoft.com/office/drawing/2010/main" xmlns="" w="9525">
                   <a:solidFill>
                     <a:srgbClr val="000000"/>
                   </a:solidFill>
@@ -2056,7 +2056,7 @@
             </a:ln>
             <a:extLst>
               <a:ext uri="{91240B29-F687-4f45-9708-019B960494DF}">
-                <a14:hiddenLine xmlns="" xmlns:a14="http://schemas.microsoft.com/office/drawing/2010/main" w="9525">
+                <a14:hiddenLine xmlns:a14="http://schemas.microsoft.com/office/drawing/2010/main" xmlns="" w="9525">
                   <a:solidFill>
                     <a:srgbClr val="000000"/>
                   </a:solidFill>
@@ -2166,7 +2166,7 @@
             </a:ln>
             <a:extLst>
               <a:ext uri="{91240B29-F687-4f45-9708-019B960494DF}">
-                <a14:hiddenLine xmlns="" xmlns:a14="http://schemas.microsoft.com/office/drawing/2010/main" w="9525">
+                <a14:hiddenLine xmlns:a14="http://schemas.microsoft.com/office/drawing/2010/main" xmlns="" w="9525">
                   <a:solidFill>
                     <a:srgbClr val="000000"/>
                   </a:solidFill>
@@ -2228,7 +2228,7 @@
             </a:ln>
             <a:extLst>
               <a:ext uri="{91240B29-F687-4f45-9708-019B960494DF}">
-                <a14:hiddenLine xmlns="" xmlns:a14="http://schemas.microsoft.com/office/drawing/2010/main" w="9525">
+                <a14:hiddenLine xmlns:a14="http://schemas.microsoft.com/office/drawing/2010/main" xmlns="" w="9525">
                   <a:solidFill>
                     <a:srgbClr val="000000"/>
                   </a:solidFill>
@@ -2318,7 +2318,7 @@
             </a:ln>
             <a:extLst>
               <a:ext uri="{91240B29-F687-4f45-9708-019B960494DF}">
-                <a14:hiddenLine xmlns="" xmlns:a14="http://schemas.microsoft.com/office/drawing/2010/main" w="9525">
+                <a14:hiddenLine xmlns:a14="http://schemas.microsoft.com/office/drawing/2010/main" xmlns="" w="9525">
                   <a:solidFill>
                     <a:srgbClr val="000000"/>
                   </a:solidFill>
@@ -2408,7 +2408,7 @@
             </a:ln>
             <a:extLst>
               <a:ext uri="{91240B29-F687-4f45-9708-019B960494DF}">
-                <a14:hiddenLine xmlns="" xmlns:a14="http://schemas.microsoft.com/office/drawing/2010/main" w="9525">
+                <a14:hiddenLine xmlns:a14="http://schemas.microsoft.com/office/drawing/2010/main" xmlns="" w="9525">
                   <a:solidFill>
                     <a:srgbClr val="000000"/>
                   </a:solidFill>
@@ -2470,7 +2470,7 @@
             </a:ln>
             <a:extLst>
               <a:ext uri="{91240B29-F687-4f45-9708-019B960494DF}">
-                <a14:hiddenLine xmlns="" xmlns:a14="http://schemas.microsoft.com/office/drawing/2010/main" w="9525">
+                <a14:hiddenLine xmlns:a14="http://schemas.microsoft.com/office/drawing/2010/main" xmlns="" w="9525">
                   <a:solidFill>
                     <a:srgbClr val="000000"/>
                   </a:solidFill>
@@ -2560,7 +2560,7 @@
             </a:ln>
             <a:extLst>
               <a:ext uri="{91240B29-F687-4f45-9708-019B960494DF}">
-                <a14:hiddenLine xmlns="" xmlns:a14="http://schemas.microsoft.com/office/drawing/2010/main" w="9525">
+                <a14:hiddenLine xmlns:a14="http://schemas.microsoft.com/office/drawing/2010/main" xmlns="" w="9525">
                   <a:solidFill>
                     <a:srgbClr val="000000"/>
                   </a:solidFill>
@@ -2650,7 +2650,7 @@
             </a:ln>
             <a:extLst>
               <a:ext uri="{91240B29-F687-4f45-9708-019B960494DF}">
-                <a14:hiddenLine xmlns="" xmlns:a14="http://schemas.microsoft.com/office/drawing/2010/main" w="9525">
+                <a14:hiddenLine xmlns:a14="http://schemas.microsoft.com/office/drawing/2010/main" xmlns="" w="9525">
                   <a:solidFill>
                     <a:srgbClr val="000000"/>
                   </a:solidFill>
@@ -2706,7 +2706,7 @@
             </a:ln>
             <a:extLst>
               <a:ext uri="{91240B29-F687-4f45-9708-019B960494DF}">
-                <a14:hiddenLine xmlns="" xmlns:a14="http://schemas.microsoft.com/office/drawing/2010/main" w="9525">
+                <a14:hiddenLine xmlns:a14="http://schemas.microsoft.com/office/drawing/2010/main" xmlns="" w="9525">
                   <a:solidFill>
                     <a:srgbClr val="000000"/>
                   </a:solidFill>
@@ -2796,7 +2796,7 @@
             </a:ln>
             <a:extLst>
               <a:ext uri="{91240B29-F687-4f45-9708-019B960494DF}">
-                <a14:hiddenLine xmlns="" xmlns:a14="http://schemas.microsoft.com/office/drawing/2010/main" w="9525">
+                <a14:hiddenLine xmlns:a14="http://schemas.microsoft.com/office/drawing/2010/main" xmlns="" w="9525">
                   <a:solidFill>
                     <a:srgbClr val="000000"/>
                   </a:solidFill>
@@ -2852,7 +2852,7 @@
             </a:ln>
             <a:extLst>
               <a:ext uri="{91240B29-F687-4f45-9708-019B960494DF}">
-                <a14:hiddenLine xmlns="" xmlns:a14="http://schemas.microsoft.com/office/drawing/2010/main" w="9525">
+                <a14:hiddenLine xmlns:a14="http://schemas.microsoft.com/office/drawing/2010/main" xmlns="" w="9525">
                   <a:solidFill>
                     <a:srgbClr val="000000"/>
                   </a:solidFill>
@@ -2942,7 +2942,7 @@
             </a:ln>
             <a:extLst>
               <a:ext uri="{91240B29-F687-4f45-9708-019B960494DF}">
-                <a14:hiddenLine xmlns="" xmlns:a14="http://schemas.microsoft.com/office/drawing/2010/main" w="9525">
+                <a14:hiddenLine xmlns:a14="http://schemas.microsoft.com/office/drawing/2010/main" xmlns="" w="9525">
                   <a:solidFill>
                     <a:srgbClr val="000000"/>
                   </a:solidFill>
@@ -3010,7 +3010,7 @@
             </a:ln>
             <a:extLst>
               <a:ext uri="{91240B29-F687-4f45-9708-019B960494DF}">
-                <a14:hiddenLine xmlns="" xmlns:a14="http://schemas.microsoft.com/office/drawing/2010/main" w="9525">
+                <a14:hiddenLine xmlns:a14="http://schemas.microsoft.com/office/drawing/2010/main" xmlns="" w="9525">
                   <a:solidFill>
                     <a:srgbClr val="000000"/>
                   </a:solidFill>
@@ -3100,7 +3100,7 @@
             </a:ln>
             <a:extLst>
               <a:ext uri="{91240B29-F687-4f45-9708-019B960494DF}">
-                <a14:hiddenLine xmlns="" xmlns:a14="http://schemas.microsoft.com/office/drawing/2010/main" w="9525">
+                <a14:hiddenLine xmlns:a14="http://schemas.microsoft.com/office/drawing/2010/main" xmlns="" w="9525">
                   <a:solidFill>
                     <a:srgbClr val="000000"/>
                   </a:solidFill>
@@ -3168,7 +3168,7 @@
             </a:ln>
             <a:extLst>
               <a:ext uri="{91240B29-F687-4f45-9708-019B960494DF}">
-                <a14:hiddenLine xmlns="" xmlns:a14="http://schemas.microsoft.com/office/drawing/2010/main" w="9525">
+                <a14:hiddenLine xmlns:a14="http://schemas.microsoft.com/office/drawing/2010/main" xmlns="" w="9525">
                   <a:solidFill>
                     <a:srgbClr val="000000"/>
                   </a:solidFill>
@@ -3258,7 +3258,7 @@
             </a:ln>
             <a:extLst>
               <a:ext uri="{91240B29-F687-4f45-9708-019B960494DF}">
-                <a14:hiddenLine xmlns="" xmlns:a14="http://schemas.microsoft.com/office/drawing/2010/main" w="9525">
+                <a14:hiddenLine xmlns:a14="http://schemas.microsoft.com/office/drawing/2010/main" xmlns="" w="9525">
                   <a:solidFill>
                     <a:srgbClr val="000000"/>
                   </a:solidFill>
@@ -3292,7 +3292,7 @@
             </a:ln>
             <a:extLst>
               <a:ext uri="{91240B29-F687-4f45-9708-019B960494DF}">
-                <a14:hiddenLine xmlns="" xmlns:a14="http://schemas.microsoft.com/office/drawing/2010/main" w="9525">
+                <a14:hiddenLine xmlns:a14="http://schemas.microsoft.com/office/drawing/2010/main" xmlns="" w="9525">
                   <a:solidFill>
                     <a:srgbClr val="000000"/>
                   </a:solidFill>
@@ -3382,7 +3382,7 @@
             </a:ln>
             <a:extLst>
               <a:ext uri="{91240B29-F687-4f45-9708-019B960494DF}">
-                <a14:hiddenLine xmlns="" xmlns:a14="http://schemas.microsoft.com/office/drawing/2010/main" w="9525">
+                <a14:hiddenLine xmlns:a14="http://schemas.microsoft.com/office/drawing/2010/main" xmlns="" w="9525">
                   <a:solidFill>
                     <a:srgbClr val="000000"/>
                   </a:solidFill>
@@ -3444,7 +3444,7 @@
             </a:ln>
             <a:extLst>
               <a:ext uri="{91240B29-F687-4f45-9708-019B960494DF}">
-                <a14:hiddenLine xmlns="" xmlns:a14="http://schemas.microsoft.com/office/drawing/2010/main" w="9525">
+                <a14:hiddenLine xmlns:a14="http://schemas.microsoft.com/office/drawing/2010/main" xmlns="" w="9525">
                   <a:solidFill>
                     <a:srgbClr val="000000"/>
                   </a:solidFill>
@@ -3506,7 +3506,7 @@
             </a:ln>
             <a:extLst>
               <a:ext uri="{91240B29-F687-4f45-9708-019B960494DF}">
-                <a14:hiddenLine xmlns="" xmlns:a14="http://schemas.microsoft.com/office/drawing/2010/main" w="9525">
+                <a14:hiddenLine xmlns:a14="http://schemas.microsoft.com/office/drawing/2010/main" xmlns="" w="9525">
                   <a:solidFill>
                     <a:srgbClr val="000000"/>
                   </a:solidFill>
@@ -3596,7 +3596,7 @@
             </a:ln>
             <a:extLst>
               <a:ext uri="{91240B29-F687-4f45-9708-019B960494DF}">
-                <a14:hiddenLine xmlns="" xmlns:a14="http://schemas.microsoft.com/office/drawing/2010/main" w="9525">
+                <a14:hiddenLine xmlns:a14="http://schemas.microsoft.com/office/drawing/2010/main" xmlns="" w="9525">
                   <a:solidFill>
                     <a:srgbClr val="000000"/>
                   </a:solidFill>
@@ -3664,7 +3664,7 @@
             </a:ln>
             <a:extLst>
               <a:ext uri="{91240B29-F687-4f45-9708-019B960494DF}">
-                <a14:hiddenLine xmlns="" xmlns:a14="http://schemas.microsoft.com/office/drawing/2010/main" w="9525">
+                <a14:hiddenLine xmlns:a14="http://schemas.microsoft.com/office/drawing/2010/main" xmlns="" w="9525">
                   <a:solidFill>
                     <a:srgbClr val="000000"/>
                   </a:solidFill>
@@ -3726,7 +3726,7 @@
             </a:ln>
             <a:extLst>
               <a:ext uri="{91240B29-F687-4f45-9708-019B960494DF}">
-                <a14:hiddenLine xmlns="" xmlns:a14="http://schemas.microsoft.com/office/drawing/2010/main" w="9525">
+                <a14:hiddenLine xmlns:a14="http://schemas.microsoft.com/office/drawing/2010/main" xmlns="" w="9525">
                   <a:solidFill>
                     <a:srgbClr val="000000"/>
                   </a:solidFill>
@@ -3816,7 +3816,7 @@
             </a:ln>
             <a:extLst>
               <a:ext uri="{91240B29-F687-4f45-9708-019B960494DF}">
-                <a14:hiddenLine xmlns="" xmlns:a14="http://schemas.microsoft.com/office/drawing/2010/main" w="9525">
+                <a14:hiddenLine xmlns:a14="http://schemas.microsoft.com/office/drawing/2010/main" xmlns="" w="9525">
                   <a:solidFill>
                     <a:srgbClr val="000000"/>
                   </a:solidFill>
@@ -3878,7 +3878,7 @@
             </a:ln>
             <a:extLst>
               <a:ext uri="{91240B29-F687-4f45-9708-019B960494DF}">
-                <a14:hiddenLine xmlns="" xmlns:a14="http://schemas.microsoft.com/office/drawing/2010/main" w="9525">
+                <a14:hiddenLine xmlns:a14="http://schemas.microsoft.com/office/drawing/2010/main" xmlns="" w="9525">
                   <a:solidFill>
                     <a:srgbClr val="000000"/>
                   </a:solidFill>
@@ -3968,7 +3968,7 @@
             </a:ln>
             <a:extLst>
               <a:ext uri="{91240B29-F687-4f45-9708-019B960494DF}">
-                <a14:hiddenLine xmlns="" xmlns:a14="http://schemas.microsoft.com/office/drawing/2010/main" w="9525">
+                <a14:hiddenLine xmlns:a14="http://schemas.microsoft.com/office/drawing/2010/main" xmlns="" w="9525">
                   <a:solidFill>
                     <a:srgbClr val="000000"/>
                   </a:solidFill>
@@ -4030,7 +4030,7 @@
             </a:ln>
             <a:extLst>
               <a:ext uri="{91240B29-F687-4f45-9708-019B960494DF}">
-                <a14:hiddenLine xmlns="" xmlns:a14="http://schemas.microsoft.com/office/drawing/2010/main" w="9525">
+                <a14:hiddenLine xmlns:a14="http://schemas.microsoft.com/office/drawing/2010/main" xmlns="" w="9525">
                   <a:solidFill>
                     <a:srgbClr val="000000"/>
                   </a:solidFill>
@@ -4120,7 +4120,7 @@
             </a:ln>
             <a:extLst>
               <a:ext uri="{91240B29-F687-4f45-9708-019B960494DF}">
-                <a14:hiddenLine xmlns="" xmlns:a14="http://schemas.microsoft.com/office/drawing/2010/main" w="9525">
+                <a14:hiddenLine xmlns:a14="http://schemas.microsoft.com/office/drawing/2010/main" xmlns="" w="9525">
                   <a:solidFill>
                     <a:srgbClr val="000000"/>
                   </a:solidFill>
@@ -4154,7 +4154,7 @@
             </a:ln>
             <a:extLst>
               <a:ext uri="{91240B29-F687-4f45-9708-019B960494DF}">
-                <a14:hiddenLine xmlns="" xmlns:a14="http://schemas.microsoft.com/office/drawing/2010/main" w="9525">
+                <a14:hiddenLine xmlns:a14="http://schemas.microsoft.com/office/drawing/2010/main" xmlns="" w="9525">
                   <a:solidFill>
                     <a:srgbClr val="000000"/>
                   </a:solidFill>
@@ -4219,7 +4219,7 @@
             </a:ln>
             <a:extLst>
               <a:ext uri="{91240B29-F687-4f45-9708-019B960494DF}">
-                <a14:hiddenLine xmlns="" xmlns:a14="http://schemas.microsoft.com/office/drawing/2010/main" w="9525">
+                <a14:hiddenLine xmlns:a14="http://schemas.microsoft.com/office/drawing/2010/main" xmlns="" w="9525">
                   <a:solidFill>
                     <a:srgbClr val="000000"/>
                   </a:solidFill>
@@ -4309,7 +4309,7 @@
             </a:ln>
             <a:extLst>
               <a:ext uri="{91240B29-F687-4f45-9708-019B960494DF}">
-                <a14:hiddenLine xmlns="" xmlns:a14="http://schemas.microsoft.com/office/drawing/2010/main" w="9525">
+                <a14:hiddenLine xmlns:a14="http://schemas.microsoft.com/office/drawing/2010/main" xmlns="" w="9525">
                   <a:solidFill>
                     <a:srgbClr val="000000"/>
                   </a:solidFill>
@@ -4371,7 +4371,7 @@
             </a:ln>
             <a:extLst>
               <a:ext uri="{91240B29-F687-4f45-9708-019B960494DF}">
-                <a14:hiddenLine xmlns="" xmlns:a14="http://schemas.microsoft.com/office/drawing/2010/main" w="9525">
+                <a14:hiddenLine xmlns:a14="http://schemas.microsoft.com/office/drawing/2010/main" xmlns="" w="9525">
                   <a:solidFill>
                     <a:srgbClr val="000000"/>
                   </a:solidFill>
@@ -4461,7 +4461,7 @@
             </a:ln>
             <a:extLst>
               <a:ext uri="{91240B29-F687-4f45-9708-019B960494DF}">
-                <a14:hiddenLine xmlns="" xmlns:a14="http://schemas.microsoft.com/office/drawing/2010/main" w="9525">
+                <a14:hiddenLine xmlns:a14="http://schemas.microsoft.com/office/drawing/2010/main" xmlns="" w="9525">
                   <a:solidFill>
                     <a:srgbClr val="000000"/>
                   </a:solidFill>
@@ -4551,7 +4551,7 @@
             </a:ln>
             <a:extLst>
               <a:ext uri="{91240B29-F687-4f45-9708-019B960494DF}">
-                <a14:hiddenLine xmlns="" xmlns:a14="http://schemas.microsoft.com/office/drawing/2010/main" w="9525">
+                <a14:hiddenLine xmlns:a14="http://schemas.microsoft.com/office/drawing/2010/main" xmlns="" w="9525">
                   <a:solidFill>
                     <a:srgbClr val="000000"/>
                   </a:solidFill>
@@ -4616,7 +4616,7 @@
             </a:ln>
             <a:extLst>
               <a:ext uri="{91240B29-F687-4f45-9708-019B960494DF}">
-                <a14:hiddenLine xmlns="" xmlns:a14="http://schemas.microsoft.com/office/drawing/2010/main" w="9525">
+                <a14:hiddenLine xmlns:a14="http://schemas.microsoft.com/office/drawing/2010/main" xmlns="" w="9525">
                   <a:solidFill>
                     <a:srgbClr val="000000"/>
                   </a:solidFill>
@@ -4678,7 +4678,7 @@
             </a:ln>
             <a:extLst>
               <a:ext uri="{91240B29-F687-4f45-9708-019B960494DF}">
-                <a14:hiddenLine xmlns="" xmlns:a14="http://schemas.microsoft.com/office/drawing/2010/main" w="9525">
+                <a14:hiddenLine xmlns:a14="http://schemas.microsoft.com/office/drawing/2010/main" xmlns="" w="9525">
                   <a:solidFill>
                     <a:srgbClr val="000000"/>
                   </a:solidFill>
@@ -4768,7 +4768,7 @@
             </a:ln>
             <a:extLst>
               <a:ext uri="{91240B29-F687-4f45-9708-019B960494DF}">
-                <a14:hiddenLine xmlns="" xmlns:a14="http://schemas.microsoft.com/office/drawing/2010/main" w="9525">
+                <a14:hiddenLine xmlns:a14="http://schemas.microsoft.com/office/drawing/2010/main" xmlns="" w="9525">
                   <a:solidFill>
                     <a:srgbClr val="000000"/>
                   </a:solidFill>
@@ -4858,7 +4858,7 @@
             </a:ln>
             <a:extLst>
               <a:ext uri="{91240B29-F687-4f45-9708-019B960494DF}">
-                <a14:hiddenLine xmlns="" xmlns:a14="http://schemas.microsoft.com/office/drawing/2010/main" w="9525">
+                <a14:hiddenLine xmlns:a14="http://schemas.microsoft.com/office/drawing/2010/main" xmlns="" w="9525">
                   <a:solidFill>
                     <a:srgbClr val="000000"/>
                   </a:solidFill>
@@ -4920,7 +4920,7 @@
             </a:ln>
             <a:extLst>
               <a:ext uri="{91240B29-F687-4f45-9708-019B960494DF}">
-                <a14:hiddenLine xmlns="" xmlns:a14="http://schemas.microsoft.com/office/drawing/2010/main" w="9525">
+                <a14:hiddenLine xmlns:a14="http://schemas.microsoft.com/office/drawing/2010/main" xmlns="" w="9525">
                   <a:solidFill>
                     <a:srgbClr val="000000"/>
                   </a:solidFill>
@@ -5040,7 +5040,7 @@
             </a:ln>
             <a:extLst>
               <a:ext uri="{91240B29-F687-4f45-9708-019B960494DF}">
-                <a14:hiddenLine xmlns="" xmlns:a14="http://schemas.microsoft.com/office/drawing/2010/main" w="9525">
+                <a14:hiddenLine xmlns:a14="http://schemas.microsoft.com/office/drawing/2010/main" xmlns="" w="9525">
                   <a:solidFill>
                     <a:srgbClr val="000000"/>
                   </a:solidFill>
@@ -5108,7 +5108,7 @@
             </a:ln>
             <a:extLst>
               <a:ext uri="{91240B29-F687-4f45-9708-019B960494DF}">
-                <a14:hiddenLine xmlns="" xmlns:a14="http://schemas.microsoft.com/office/drawing/2010/main" w="9525">
+                <a14:hiddenLine xmlns:a14="http://schemas.microsoft.com/office/drawing/2010/main" xmlns="" w="9525">
                   <a:solidFill>
                     <a:srgbClr val="000000"/>
                   </a:solidFill>
@@ -5198,7 +5198,7 @@
             </a:ln>
             <a:extLst>
               <a:ext uri="{91240B29-F687-4f45-9708-019B960494DF}">
-                <a14:hiddenLine xmlns="" xmlns:a14="http://schemas.microsoft.com/office/drawing/2010/main" w="9525">
+                <a14:hiddenLine xmlns:a14="http://schemas.microsoft.com/office/drawing/2010/main" xmlns="" w="9525">
                   <a:solidFill>
                     <a:srgbClr val="000000"/>
                   </a:solidFill>
@@ -10221,7 +10221,7 @@
           <a:noFill/>
           <a:extLst>
             <a:ext uri="{909E8E84-426E-40dd-AFC4-6F175D3DCCD1}">
-              <a14:hiddenFill xmlns="" xmlns:a14="http://schemas.microsoft.com/office/drawing/2010/main">
+              <a14:hiddenFill xmlns:a14="http://schemas.microsoft.com/office/drawing/2010/main" xmlns="">
                 <a:solidFill>
                   <a:srgbClr val="FFFFFF"/>
                 </a:solidFill>
@@ -10295,7 +10295,7 @@
               </a:ln>
               <a:extLst>
                 <a:ext uri="{91240B29-F687-4f45-9708-019B960494DF}">
-                  <a14:hiddenLine xmlns="" xmlns:a14="http://schemas.microsoft.com/office/drawing/2010/main" w="9525">
+                  <a14:hiddenLine xmlns:a14="http://schemas.microsoft.com/office/drawing/2010/main" xmlns="" w="9525">
                     <a:solidFill>
                       <a:srgbClr val="000000"/>
                     </a:solidFill>
@@ -10385,7 +10385,7 @@
               </a:ln>
               <a:extLst>
                 <a:ext uri="{91240B29-F687-4f45-9708-019B960494DF}">
-                  <a14:hiddenLine xmlns="" xmlns:a14="http://schemas.microsoft.com/office/drawing/2010/main" w="9525">
+                  <a14:hiddenLine xmlns:a14="http://schemas.microsoft.com/office/drawing/2010/main" xmlns="" w="9525">
                     <a:solidFill>
                       <a:srgbClr val="000000"/>
                     </a:solidFill>
@@ -10475,7 +10475,7 @@
               </a:ln>
               <a:extLst>
                 <a:ext uri="{91240B29-F687-4f45-9708-019B960494DF}">
-                  <a14:hiddenLine xmlns="" xmlns:a14="http://schemas.microsoft.com/office/drawing/2010/main" w="9525">
+                  <a14:hiddenLine xmlns:a14="http://schemas.microsoft.com/office/drawing/2010/main" xmlns="" w="9525">
                     <a:solidFill>
                       <a:srgbClr val="000000"/>
                     </a:solidFill>
@@ -10537,7 +10537,7 @@
               </a:ln>
               <a:extLst>
                 <a:ext uri="{91240B29-F687-4f45-9708-019B960494DF}">
-                  <a14:hiddenLine xmlns="" xmlns:a14="http://schemas.microsoft.com/office/drawing/2010/main" w="9525">
+                  <a14:hiddenLine xmlns:a14="http://schemas.microsoft.com/office/drawing/2010/main" xmlns="" w="9525">
                     <a:solidFill>
                       <a:srgbClr val="000000"/>
                     </a:solidFill>
@@ -10627,7 +10627,7 @@
               </a:ln>
               <a:extLst>
                 <a:ext uri="{91240B29-F687-4f45-9708-019B960494DF}">
-                  <a14:hiddenLine xmlns="" xmlns:a14="http://schemas.microsoft.com/office/drawing/2010/main" w="9525">
+                  <a14:hiddenLine xmlns:a14="http://schemas.microsoft.com/office/drawing/2010/main" xmlns="" w="9525">
                     <a:solidFill>
                       <a:srgbClr val="000000"/>
                     </a:solidFill>
@@ -10689,7 +10689,7 @@
               </a:ln>
               <a:extLst>
                 <a:ext uri="{91240B29-F687-4f45-9708-019B960494DF}">
-                  <a14:hiddenLine xmlns="" xmlns:a14="http://schemas.microsoft.com/office/drawing/2010/main" w="9525">
+                  <a14:hiddenLine xmlns:a14="http://schemas.microsoft.com/office/drawing/2010/main" xmlns="" w="9525">
                     <a:solidFill>
                       <a:srgbClr val="000000"/>
                     </a:solidFill>
@@ -10751,7 +10751,7 @@
               </a:ln>
               <a:extLst>
                 <a:ext uri="{91240B29-F687-4f45-9708-019B960494DF}">
-                  <a14:hiddenLine xmlns="" xmlns:a14="http://schemas.microsoft.com/office/drawing/2010/main" w="9525">
+                  <a14:hiddenLine xmlns:a14="http://schemas.microsoft.com/office/drawing/2010/main" xmlns="" w="9525">
                     <a:solidFill>
                       <a:srgbClr val="000000"/>
                     </a:solidFill>
@@ -10841,7 +10841,7 @@
               </a:ln>
               <a:extLst>
                 <a:ext uri="{91240B29-F687-4f45-9708-019B960494DF}">
-                  <a14:hiddenLine xmlns="" xmlns:a14="http://schemas.microsoft.com/office/drawing/2010/main" w="9525">
+                  <a14:hiddenLine xmlns:a14="http://schemas.microsoft.com/office/drawing/2010/main" xmlns="" w="9525">
                     <a:solidFill>
                       <a:srgbClr val="000000"/>
                     </a:solidFill>
@@ -10931,7 +10931,7 @@
               </a:ln>
               <a:extLst>
                 <a:ext uri="{91240B29-F687-4f45-9708-019B960494DF}">
-                  <a14:hiddenLine xmlns="" xmlns:a14="http://schemas.microsoft.com/office/drawing/2010/main" w="9525">
+                  <a14:hiddenLine xmlns:a14="http://schemas.microsoft.com/office/drawing/2010/main" xmlns="" w="9525">
                     <a:solidFill>
                       <a:srgbClr val="000000"/>
                     </a:solidFill>
@@ -10993,7 +10993,7 @@
               </a:ln>
               <a:extLst>
                 <a:ext uri="{91240B29-F687-4f45-9708-019B960494DF}">
-                  <a14:hiddenLine xmlns="" xmlns:a14="http://schemas.microsoft.com/office/drawing/2010/main" w="9525">
+                  <a14:hiddenLine xmlns:a14="http://schemas.microsoft.com/office/drawing/2010/main" xmlns="" w="9525">
                     <a:solidFill>
                       <a:srgbClr val="000000"/>
                     </a:solidFill>
@@ -11103,7 +11103,7 @@
               </a:ln>
               <a:extLst>
                 <a:ext uri="{91240B29-F687-4f45-9708-019B960494DF}">
-                  <a14:hiddenLine xmlns="" xmlns:a14="http://schemas.microsoft.com/office/drawing/2010/main" w="9525">
+                  <a14:hiddenLine xmlns:a14="http://schemas.microsoft.com/office/drawing/2010/main" xmlns="" w="9525">
                     <a:solidFill>
                       <a:srgbClr val="000000"/>
                     </a:solidFill>
@@ -11187,7 +11187,7 @@
               </a:ln>
               <a:extLst>
                 <a:ext uri="{91240B29-F687-4f45-9708-019B960494DF}">
-                  <a14:hiddenLine xmlns="" xmlns:a14="http://schemas.microsoft.com/office/drawing/2010/main" w="9525">
+                  <a14:hiddenLine xmlns:a14="http://schemas.microsoft.com/office/drawing/2010/main" xmlns="" w="9525">
                     <a:solidFill>
                       <a:srgbClr val="000000"/>
                     </a:solidFill>
@@ -11249,7 +11249,7 @@
               </a:ln>
               <a:extLst>
                 <a:ext uri="{91240B29-F687-4f45-9708-019B960494DF}">
-                  <a14:hiddenLine xmlns="" xmlns:a14="http://schemas.microsoft.com/office/drawing/2010/main" w="9525">
+                  <a14:hiddenLine xmlns:a14="http://schemas.microsoft.com/office/drawing/2010/main" xmlns="" w="9525">
                     <a:solidFill>
                       <a:srgbClr val="000000"/>
                     </a:solidFill>
@@ -11311,7 +11311,7 @@
               </a:ln>
               <a:extLst>
                 <a:ext uri="{91240B29-F687-4f45-9708-019B960494DF}">
-                  <a14:hiddenLine xmlns="" xmlns:a14="http://schemas.microsoft.com/office/drawing/2010/main" w="9525">
+                  <a14:hiddenLine xmlns:a14="http://schemas.microsoft.com/office/drawing/2010/main" xmlns="" w="9525">
                     <a:solidFill>
                       <a:srgbClr val="000000"/>
                     </a:solidFill>
@@ -11401,7 +11401,7 @@
               </a:ln>
               <a:extLst>
                 <a:ext uri="{91240B29-F687-4f45-9708-019B960494DF}">
-                  <a14:hiddenLine xmlns="" xmlns:a14="http://schemas.microsoft.com/office/drawing/2010/main" w="9525">
+                  <a14:hiddenLine xmlns:a14="http://schemas.microsoft.com/office/drawing/2010/main" xmlns="" w="9525">
                     <a:solidFill>
                       <a:srgbClr val="000000"/>
                     </a:solidFill>
@@ -11435,7 +11435,7 @@
               </a:ln>
               <a:extLst>
                 <a:ext uri="{91240B29-F687-4f45-9708-019B960494DF}">
-                  <a14:hiddenLine xmlns="" xmlns:a14="http://schemas.microsoft.com/office/drawing/2010/main" w="9525">
+                  <a14:hiddenLine xmlns:a14="http://schemas.microsoft.com/office/drawing/2010/main" xmlns="" w="9525">
                     <a:solidFill>
                       <a:srgbClr val="000000"/>
                     </a:solidFill>
@@ -11500,7 +11500,7 @@
               </a:ln>
               <a:extLst>
                 <a:ext uri="{91240B29-F687-4f45-9708-019B960494DF}">
-                  <a14:hiddenLine xmlns="" xmlns:a14="http://schemas.microsoft.com/office/drawing/2010/main" w="9525">
+                  <a14:hiddenLine xmlns:a14="http://schemas.microsoft.com/office/drawing/2010/main" xmlns="" w="9525">
                     <a:solidFill>
                       <a:srgbClr val="000000"/>
                     </a:solidFill>
@@ -11590,7 +11590,7 @@
               </a:ln>
               <a:extLst>
                 <a:ext uri="{91240B29-F687-4f45-9708-019B960494DF}">
-                  <a14:hiddenLine xmlns="" xmlns:a14="http://schemas.microsoft.com/office/drawing/2010/main" w="9525">
+                  <a14:hiddenLine xmlns:a14="http://schemas.microsoft.com/office/drawing/2010/main" xmlns="" w="9525">
                     <a:solidFill>
                       <a:srgbClr val="000000"/>
                     </a:solidFill>
@@ -11652,7 +11652,7 @@
               </a:ln>
               <a:extLst>
                 <a:ext uri="{91240B29-F687-4f45-9708-019B960494DF}">
-                  <a14:hiddenLine xmlns="" xmlns:a14="http://schemas.microsoft.com/office/drawing/2010/main" w="9525">
+                  <a14:hiddenLine xmlns:a14="http://schemas.microsoft.com/office/drawing/2010/main" xmlns="" w="9525">
                     <a:solidFill>
                       <a:srgbClr val="000000"/>
                     </a:solidFill>
@@ -11742,7 +11742,7 @@
               </a:ln>
               <a:extLst>
                 <a:ext uri="{91240B29-F687-4f45-9708-019B960494DF}">
-                  <a14:hiddenLine xmlns="" xmlns:a14="http://schemas.microsoft.com/office/drawing/2010/main" w="9525">
+                  <a14:hiddenLine xmlns:a14="http://schemas.microsoft.com/office/drawing/2010/main" xmlns="" w="9525">
                     <a:solidFill>
                       <a:srgbClr val="000000"/>
                     </a:solidFill>
@@ -11807,7 +11807,7 @@
               </a:ln>
               <a:extLst>
                 <a:ext uri="{91240B29-F687-4f45-9708-019B960494DF}">
-                  <a14:hiddenLine xmlns="" xmlns:a14="http://schemas.microsoft.com/office/drawing/2010/main" w="9525">
+                  <a14:hiddenLine xmlns:a14="http://schemas.microsoft.com/office/drawing/2010/main" xmlns="" w="9525">
                     <a:solidFill>
                       <a:srgbClr val="000000"/>
                     </a:solidFill>
@@ -11869,7 +11869,7 @@
               </a:ln>
               <a:extLst>
                 <a:ext uri="{91240B29-F687-4f45-9708-019B960494DF}">
-                  <a14:hiddenLine xmlns="" xmlns:a14="http://schemas.microsoft.com/office/drawing/2010/main" w="9525">
+                  <a14:hiddenLine xmlns:a14="http://schemas.microsoft.com/office/drawing/2010/main" xmlns="" w="9525">
                     <a:solidFill>
                       <a:srgbClr val="000000"/>
                     </a:solidFill>
@@ -11959,7 +11959,7 @@
               </a:ln>
               <a:extLst>
                 <a:ext uri="{91240B29-F687-4f45-9708-019B960494DF}">
-                  <a14:hiddenLine xmlns="" xmlns:a14="http://schemas.microsoft.com/office/drawing/2010/main" w="9525">
+                  <a14:hiddenLine xmlns:a14="http://schemas.microsoft.com/office/drawing/2010/main" xmlns="" w="9525">
                     <a:solidFill>
                       <a:srgbClr val="000000"/>
                     </a:solidFill>
@@ -12049,7 +12049,7 @@
               </a:ln>
               <a:extLst>
                 <a:ext uri="{91240B29-F687-4f45-9708-019B960494DF}">
-                  <a14:hiddenLine xmlns="" xmlns:a14="http://schemas.microsoft.com/office/drawing/2010/main" w="9525">
+                  <a14:hiddenLine xmlns:a14="http://schemas.microsoft.com/office/drawing/2010/main" xmlns="" w="9525">
                     <a:solidFill>
                       <a:srgbClr val="000000"/>
                     </a:solidFill>
@@ -12114,7 +12114,7 @@
               </a:ln>
               <a:extLst>
                 <a:ext uri="{91240B29-F687-4f45-9708-019B960494DF}">
-                  <a14:hiddenLine xmlns="" xmlns:a14="http://schemas.microsoft.com/office/drawing/2010/main" w="9525">
+                  <a14:hiddenLine xmlns:a14="http://schemas.microsoft.com/office/drawing/2010/main" xmlns="" w="9525">
                     <a:solidFill>
                       <a:srgbClr val="000000"/>
                     </a:solidFill>
@@ -12234,7 +12234,7 @@
               </a:ln>
               <a:extLst>
                 <a:ext uri="{91240B29-F687-4f45-9708-019B960494DF}">
-                  <a14:hiddenLine xmlns="" xmlns:a14="http://schemas.microsoft.com/office/drawing/2010/main" w="9525">
+                  <a14:hiddenLine xmlns:a14="http://schemas.microsoft.com/office/drawing/2010/main" xmlns="" w="9525">
                     <a:solidFill>
                       <a:srgbClr val="000000"/>
                     </a:solidFill>
@@ -12332,7 +12332,7 @@
               </a:ln>
               <a:extLst>
                 <a:ext uri="{91240B29-F687-4f45-9708-019B960494DF}">
-                  <a14:hiddenLine xmlns="" xmlns:a14="http://schemas.microsoft.com/office/drawing/2010/main" w="9525">
+                  <a14:hiddenLine xmlns:a14="http://schemas.microsoft.com/office/drawing/2010/main" xmlns="" w="9525">
                     <a:solidFill>
                       <a:srgbClr val="000000"/>
                     </a:solidFill>
@@ -12447,7 +12447,7 @@
               </a:ln>
               <a:extLst>
                 <a:ext uri="{91240B29-F687-4f45-9708-019B960494DF}">
-                  <a14:hiddenLine xmlns="" xmlns:a14="http://schemas.microsoft.com/office/drawing/2010/main" w="9525">
+                  <a14:hiddenLine xmlns:a14="http://schemas.microsoft.com/office/drawing/2010/main" xmlns="" w="9525">
                     <a:solidFill>
                       <a:srgbClr val="000000"/>
                     </a:solidFill>
@@ -12537,7 +12537,7 @@
               </a:ln>
               <a:extLst>
                 <a:ext uri="{91240B29-F687-4f45-9708-019B960494DF}">
-                  <a14:hiddenLine xmlns="" xmlns:a14="http://schemas.microsoft.com/office/drawing/2010/main" w="9525">
+                  <a14:hiddenLine xmlns:a14="http://schemas.microsoft.com/office/drawing/2010/main" xmlns="" w="9525">
                     <a:solidFill>
                       <a:srgbClr val="000000"/>
                     </a:solidFill>
@@ -12602,7 +12602,7 @@
               </a:ln>
               <a:extLst>
                 <a:ext uri="{91240B29-F687-4f45-9708-019B960494DF}">
-                  <a14:hiddenLine xmlns="" xmlns:a14="http://schemas.microsoft.com/office/drawing/2010/main" w="9525">
+                  <a14:hiddenLine xmlns:a14="http://schemas.microsoft.com/office/drawing/2010/main" xmlns="" w="9525">
                     <a:solidFill>
                       <a:srgbClr val="000000"/>
                     </a:solidFill>
@@ -12692,7 +12692,7 @@
               </a:ln>
               <a:extLst>
                 <a:ext uri="{91240B29-F687-4f45-9708-019B960494DF}">
-                  <a14:hiddenLine xmlns="" xmlns:a14="http://schemas.microsoft.com/office/drawing/2010/main" w="9525">
+                  <a14:hiddenLine xmlns:a14="http://schemas.microsoft.com/office/drawing/2010/main" xmlns="" w="9525">
                     <a:solidFill>
                       <a:srgbClr val="000000"/>
                     </a:solidFill>
@@ -12760,7 +12760,7 @@
               </a:ln>
               <a:extLst>
                 <a:ext uri="{91240B29-F687-4f45-9708-019B960494DF}">
-                  <a14:hiddenLine xmlns="" xmlns:a14="http://schemas.microsoft.com/office/drawing/2010/main" w="9525">
+                  <a14:hiddenLine xmlns:a14="http://schemas.microsoft.com/office/drawing/2010/main" xmlns="" w="9525">
                     <a:solidFill>
                       <a:srgbClr val="000000"/>
                     </a:solidFill>
@@ -12850,7 +12850,7 @@
               </a:ln>
               <a:extLst>
                 <a:ext uri="{91240B29-F687-4f45-9708-019B960494DF}">
-                  <a14:hiddenLine xmlns="" xmlns:a14="http://schemas.microsoft.com/office/drawing/2010/main" w="9525">
+                  <a14:hiddenLine xmlns:a14="http://schemas.microsoft.com/office/drawing/2010/main" xmlns="" w="9525">
                     <a:solidFill>
                       <a:srgbClr val="000000"/>
                     </a:solidFill>
@@ -12918,7 +12918,7 @@
               </a:ln>
               <a:extLst>
                 <a:ext uri="{91240B29-F687-4f45-9708-019B960494DF}">
-                  <a14:hiddenLine xmlns="" xmlns:a14="http://schemas.microsoft.com/office/drawing/2010/main" w="9525">
+                  <a14:hiddenLine xmlns:a14="http://schemas.microsoft.com/office/drawing/2010/main" xmlns="" w="9525">
                     <a:solidFill>
                       <a:srgbClr val="000000"/>
                     </a:solidFill>
@@ -13008,7 +13008,7 @@
               </a:ln>
               <a:extLst>
                 <a:ext uri="{91240B29-F687-4f45-9708-019B960494DF}">
-                  <a14:hiddenLine xmlns="" xmlns:a14="http://schemas.microsoft.com/office/drawing/2010/main" w="9525">
+                  <a14:hiddenLine xmlns:a14="http://schemas.microsoft.com/office/drawing/2010/main" xmlns="" w="9525">
                     <a:solidFill>
                       <a:srgbClr val="000000"/>
                     </a:solidFill>
@@ -13042,7 +13042,7 @@
               </a:ln>
               <a:extLst>
                 <a:ext uri="{91240B29-F687-4f45-9708-019B960494DF}">
-                  <a14:hiddenLine xmlns="" xmlns:a14="http://schemas.microsoft.com/office/drawing/2010/main" w="9525">
+                  <a14:hiddenLine xmlns:a14="http://schemas.microsoft.com/office/drawing/2010/main" xmlns="" w="9525">
                     <a:solidFill>
                       <a:srgbClr val="000000"/>
                     </a:solidFill>
@@ -13648,13 +13648,13 @@
         </p:nvSpPr>
         <p:spPr>
           <a:xfrm>
-            <a:off x="2513012" y="304800"/>
-            <a:ext cx="8915400" cy="2130083"/>
+            <a:off x="2284412" y="60819"/>
+            <a:ext cx="9296400" cy="1295401"/>
           </a:xfrm>
         </p:spPr>
         <p:txBody>
           <a:bodyPr>
-            <a:normAutofit/>
+            <a:normAutofit fontScale="90000"/>
           </a:bodyPr>
           <a:lstStyle/>
           <a:p>
@@ -13677,13 +13677,13 @@
         </p:nvSpPr>
         <p:spPr>
           <a:xfrm>
-            <a:off x="2627312" y="3358076"/>
-            <a:ext cx="6934200" cy="2130084"/>
+            <a:off x="2513012" y="2971800"/>
+            <a:ext cx="6324600" cy="2362200"/>
           </a:xfrm>
         </p:spPr>
         <p:txBody>
           <a:bodyPr>
-            <a:normAutofit fontScale="92500" lnSpcReduction="10000"/>
+            <a:normAutofit lnSpcReduction="10000"/>
           </a:bodyPr>
           <a:lstStyle/>
           <a:p>
@@ -13814,12 +13814,7 @@
             <p:ph type="title"/>
           </p:nvPr>
         </p:nvSpPr>
-        <p:spPr>
-          <a:xfrm>
-            <a:off x="1217612" y="228600"/>
-            <a:ext cx="10134600" cy="991772"/>
-          </a:xfrm>
-        </p:spPr>
+        <p:spPr/>
         <p:txBody>
           <a:bodyPr>
             <a:normAutofit/>
@@ -13835,17 +13830,19 @@
       </p:sp>
       <p:pic>
         <p:nvPicPr>
-          <p:cNvPr id="4" name="Picture 3">
+          <p:cNvPr id="6" name="Content Placeholder 5">
             <a:extLst>
               <a:ext uri="{FF2B5EF4-FFF2-40B4-BE49-F238E27FC236}">
-                <a16:creationId xmlns:a16="http://schemas.microsoft.com/office/drawing/2014/main" id="{DF776005-F353-4848-8B33-39FA1099252E}"/>
+                <a16:creationId xmlns:a16="http://schemas.microsoft.com/office/drawing/2014/main" id="{ACDE22F9-D9DD-4FE5-ACC6-509E43FCA848}"/>
               </a:ext>
             </a:extLst>
           </p:cNvPr>
           <p:cNvPicPr>
-            <a:picLocks noChangeAspect="1"/>
+            <a:picLocks noGrp="1" noChangeAspect="1"/>
           </p:cNvPicPr>
-          <p:nvPr/>
+          <p:nvPr>
+            <p:ph idx="1"/>
+          </p:nvPr>
         </p:nvPicPr>
         <p:blipFill>
           <a:blip r:embed="rId2"/>
@@ -13855,8 +13852,8 @@
         </p:blipFill>
         <p:spPr>
           <a:xfrm>
-            <a:off x="3275012" y="1905000"/>
-            <a:ext cx="5944115" cy="4456562"/>
+            <a:off x="2970212" y="2097088"/>
+            <a:ext cx="5559954" cy="4169966"/>
           </a:xfrm>
           <a:prstGeom prst="rect">
             <a:avLst/>
@@ -13915,12 +13912,7 @@
             <p:ph type="title"/>
           </p:nvPr>
         </p:nvSpPr>
-        <p:spPr>
-          <a:xfrm>
-            <a:off x="1065212" y="304800"/>
-            <a:ext cx="9903418" cy="914400"/>
-          </a:xfrm>
-        </p:spPr>
+        <p:spPr/>
         <p:txBody>
           <a:bodyPr>
             <a:normAutofit/>
@@ -13952,77 +13944,77 @@
         </p:nvSpPr>
         <p:spPr>
           <a:xfrm>
-            <a:off x="836612" y="1371600"/>
-            <a:ext cx="10744201" cy="4191000"/>
+            <a:off x="1141115" y="1905000"/>
+            <a:ext cx="9903419" cy="4419600"/>
           </a:xfrm>
         </p:spPr>
         <p:txBody>
           <a:bodyPr>
-            <a:normAutofit fontScale="77500" lnSpcReduction="20000"/>
+            <a:normAutofit fontScale="55000" lnSpcReduction="20000"/>
           </a:bodyPr>
           <a:lstStyle/>
           <a:p>
             <a:r>
-              <a:rPr lang="en-US" dirty="0"/>
+              <a:rPr lang="en-US" sz="3300" dirty="0"/>
               <a:t>The data was pulled from the Chronicle of Philanthropy website, scraped into csv files and read into the notebook for analysis. It revealed that the top five highest earning causes are:</a:t>
             </a:r>
           </a:p>
           <a:p>
             <a:pPr lvl="1"/>
             <a:r>
-              <a:rPr lang="en-US" dirty="0"/>
+              <a:rPr lang="en-US" sz="3300" dirty="0"/>
               <a:t>Colleges and universities </a:t>
             </a:r>
           </a:p>
           <a:p>
             <a:pPr lvl="1"/>
             <a:r>
-              <a:rPr lang="en-US" dirty="0"/>
+              <a:rPr lang="en-US" sz="3300" dirty="0"/>
               <a:t>Health </a:t>
             </a:r>
           </a:p>
           <a:p>
             <a:pPr lvl="1"/>
             <a:r>
-              <a:rPr lang="en-US" dirty="0"/>
+              <a:rPr lang="en-US" sz="3300" dirty="0"/>
               <a:t>Foundations </a:t>
             </a:r>
           </a:p>
           <a:p>
             <a:pPr lvl="1"/>
             <a:r>
-              <a:rPr lang="en-US" dirty="0"/>
+              <a:rPr lang="en-US" sz="3300" dirty="0"/>
               <a:t>Arts  </a:t>
             </a:r>
           </a:p>
           <a:p>
             <a:pPr lvl="1"/>
             <a:r>
-              <a:rPr lang="en-US" dirty="0"/>
+              <a:rPr lang="en-US" sz="3300" dirty="0"/>
               <a:t>Community foundations</a:t>
             </a:r>
           </a:p>
           <a:p>
             <a:r>
-              <a:rPr lang="en-US" dirty="0"/>
+              <a:rPr lang="en-US" sz="3300" dirty="0"/>
               <a:t>Colleges and universities total – over $20 billion </a:t>
             </a:r>
           </a:p>
           <a:p>
             <a:r>
-              <a:rPr lang="en-US" dirty="0"/>
+              <a:rPr lang="en-US" sz="3300" dirty="0"/>
               <a:t>Interesting uptick in donations to foundations in 2017, with a big increase from roughly half a billion in 2016 to 4 billion in 2017 </a:t>
             </a:r>
           </a:p>
           <a:p>
             <a:r>
-              <a:rPr lang="en-US" dirty="0"/>
+              <a:rPr lang="en-US" sz="3300" dirty="0"/>
               <a:t>Health also saw an uptick in donations in 2017, growing from 1 to 2 billion from 2016 - 2017.</a:t>
             </a:r>
           </a:p>
           <a:p>
             <a:r>
-              <a:rPr lang="en-US" dirty="0"/>
+              <a:rPr lang="en-US" sz="3300" dirty="0"/>
               <a:t>NOTE: 2018 donation numbers are incomplete. </a:t>
             </a:r>
           </a:p>
@@ -14083,12 +14075,7 @@
             <p:ph type="title"/>
           </p:nvPr>
         </p:nvSpPr>
-        <p:spPr>
-          <a:xfrm>
-            <a:off x="1293812" y="304800"/>
-            <a:ext cx="9750722" cy="1066800"/>
-          </a:xfrm>
-        </p:spPr>
+        <p:spPr/>
         <p:txBody>
           <a:bodyPr>
             <a:normAutofit/>
@@ -14115,51 +14102,51 @@
             <a:spLocks noGrp="1"/>
           </p:cNvSpPr>
           <p:nvPr>
-            <p:ph sz="half" idx="1"/>
+            <p:ph idx="1"/>
           </p:nvPr>
         </p:nvSpPr>
         <p:spPr>
           <a:xfrm>
-            <a:off x="1141113" y="1219200"/>
-            <a:ext cx="9750722" cy="4800600"/>
+            <a:off x="1065213" y="1600200"/>
+            <a:ext cx="9979322" cy="4953000"/>
           </a:xfrm>
         </p:spPr>
         <p:txBody>
           <a:bodyPr>
-            <a:normAutofit fontScale="92500" lnSpcReduction="20000"/>
+            <a:noAutofit/>
           </a:bodyPr>
           <a:lstStyle/>
           <a:p>
             <a:r>
-              <a:rPr lang="en-US" dirty="0"/>
+              <a:rPr lang="en-US" sz="1800" dirty="0"/>
               <a:t>With regard to the correlation between donor source of wealth and amount of money given over the course the four years 2015 to 2018:</a:t>
             </a:r>
           </a:p>
           <a:p>
             <a:pPr lvl="1"/>
             <a:r>
-              <a:rPr lang="en-US" dirty="0"/>
+              <a:rPr lang="en-US" sz="1800" dirty="0"/>
               <a:t>The largest donation of $1.8 billion was made to a Chan Zuckerberg Foundation from Mark Zuckerberg and Priscilla Chan in 2017. Their source of wealth was in Technology. Notably their residence of California is of no surprise.</a:t>
             </a:r>
           </a:p>
           <a:p>
             <a:pPr lvl="1"/>
             <a:r>
-              <a:rPr lang="en-US" dirty="0"/>
+              <a:rPr lang="en-US" sz="1800" dirty="0"/>
               <a:t>The wealth category groupings were bucketed to allow for distinction among 192 unique strings of 2 or more sources of wealth. This created 13 distinct categories and these were used to identify wealth source. A separate csv cross reference file was created and saved to the master repository.</a:t>
             </a:r>
           </a:p>
           <a:p>
             <a:pPr lvl="1"/>
             <a:r>
-              <a:rPr lang="en-US" dirty="0"/>
+              <a:rPr lang="en-US" sz="1800" dirty="0"/>
               <a:t>Overall 95% of all donations came from Technology followed by Manufacturing, Family Wealth and Real Estate.</a:t>
             </a:r>
           </a:p>
           <a:p>
             <a:pPr lvl="1"/>
             <a:r>
-              <a:rPr lang="en-US" dirty="0"/>
+              <a:rPr lang="en-US" sz="1800" dirty="0"/>
               <a:t>There was a relationship found with a donors source of wealth and their donation amount. Wealth categories that command more value in the market yielded higher donations. Healthcare and Retail sources of wealth yield nearly identical amounts of donations over the 4 years with Transportation and Education being the lowest. </a:t>
             </a:r>
           </a:p>
@@ -14217,12 +14204,7 @@
             <p:ph type="title"/>
           </p:nvPr>
         </p:nvSpPr>
-        <p:spPr>
-          <a:xfrm>
-            <a:off x="1218257" y="35169"/>
-            <a:ext cx="9752309" cy="1170253"/>
-          </a:xfrm>
-        </p:spPr>
+        <p:spPr/>
         <p:txBody>
           <a:bodyPr>
             <a:normAutofit/>
@@ -14254,49 +14236,53 @@
         </p:nvSpPr>
         <p:spPr>
           <a:xfrm>
-            <a:off x="836612" y="1676400"/>
-            <a:ext cx="10744201" cy="3886200"/>
+            <a:off x="1141115" y="1752600"/>
+            <a:ext cx="9903419" cy="4191000"/>
           </a:xfrm>
         </p:spPr>
         <p:txBody>
           <a:bodyPr>
-            <a:normAutofit fontScale="92500" lnSpcReduction="10000"/>
+            <a:normAutofit/>
           </a:bodyPr>
           <a:lstStyle/>
           <a:p>
             <a:r>
-              <a:rPr lang="en-US" dirty="0"/>
+              <a:rPr lang="en-US" sz="1800" dirty="0"/>
               <a:t>In real world situations the receipt of data can be in varied forms. We had to do a numbers of cleaning step to the data before we could even begin our analysis.</a:t>
             </a:r>
           </a:p>
           <a:p>
             <a:r>
-              <a:rPr lang="en-US" dirty="0"/>
+              <a:rPr lang="en-US" sz="1800" dirty="0"/>
               <a:t>It is good practice to determine treatment of null values.</a:t>
             </a:r>
           </a:p>
           <a:p>
             <a:r>
-              <a:rPr lang="en-US" dirty="0"/>
+              <a:rPr lang="en-US" sz="1800" dirty="0"/>
               <a:t>Other sources may be additive to the analysis such as, geo locations (Latitude,  Longitude). </a:t>
             </a:r>
           </a:p>
           <a:p>
             <a:r>
-              <a:rPr lang="en-US" dirty="0"/>
+              <a:rPr lang="en-US" sz="1800" dirty="0"/>
               <a:t>Additional descriptors to further categorize data may also prove useful.</a:t>
             </a:r>
           </a:p>
           <a:p>
             <a:r>
-              <a:rPr lang="en-US" dirty="0"/>
+              <a:rPr lang="en-US" sz="1800" dirty="0"/>
               <a:t>It is best to divide work equally among a team. We took this approach and it worked well. This allows for many analytical questions to be answered over a short period.</a:t>
             </a:r>
           </a:p>
           <a:p>
             <a:r>
-              <a:rPr lang="en-US" dirty="0"/>
-              <a:t>Ask more questions and ask the same question in different ways.</a:t>
+              <a:rPr lang="en-US" sz="1800" dirty="0"/>
+              <a:t>Ask more questions and ask the same question in different ways</a:t>
+            </a:r>
+            <a:r>
+              <a:rPr lang="en-US" sz="2100" dirty="0"/>
+              <a:t>.</a:t>
             </a:r>
           </a:p>
           <a:p>
@@ -14529,12 +14515,7 @@
             <p:ph type="title"/>
           </p:nvPr>
         </p:nvSpPr>
-        <p:spPr>
-          <a:xfrm>
-            <a:off x="675543" y="304800"/>
-            <a:ext cx="10971372" cy="1066800"/>
-          </a:xfrm>
-        </p:spPr>
+        <p:spPr/>
         <p:txBody>
           <a:bodyPr/>
           <a:lstStyle/>
@@ -14562,12 +14543,7 @@
             <p:ph idx="1"/>
           </p:nvPr>
         </p:nvSpPr>
-        <p:spPr>
-          <a:xfrm>
-            <a:off x="675543" y="1600200"/>
-            <a:ext cx="10971371" cy="4724400"/>
-          </a:xfrm>
-        </p:spPr>
+        <p:spPr/>
         <p:txBody>
           <a:bodyPr/>
           <a:lstStyle/>
@@ -14658,12 +14634,7 @@
             <p:ph type="title"/>
           </p:nvPr>
         </p:nvSpPr>
-        <p:spPr>
-          <a:xfrm>
-            <a:off x="836612" y="121919"/>
-            <a:ext cx="10971372" cy="1066800"/>
-          </a:xfrm>
-        </p:spPr>
+        <p:spPr/>
         <p:txBody>
           <a:bodyPr/>
           <a:lstStyle/>
@@ -14685,15 +14656,10 @@
             <p:ph idx="1"/>
           </p:nvPr>
         </p:nvSpPr>
-        <p:spPr>
-          <a:xfrm>
-            <a:off x="989012" y="1188719"/>
-            <a:ext cx="10668000" cy="4754881"/>
-          </a:xfrm>
-        </p:spPr>
+        <p:spPr/>
         <p:txBody>
           <a:bodyPr>
-            <a:normAutofit/>
+            <a:normAutofit fontScale="92500" lnSpcReduction="10000"/>
           </a:bodyPr>
           <a:lstStyle/>
           <a:p>
@@ -14803,12 +14769,7 @@
             <p:ph type="title"/>
           </p:nvPr>
         </p:nvSpPr>
-        <p:spPr>
-          <a:xfrm>
-            <a:off x="379412" y="457200"/>
-            <a:ext cx="10971372" cy="1066800"/>
-          </a:xfrm>
-        </p:spPr>
+        <p:spPr/>
         <p:txBody>
           <a:bodyPr>
             <a:normAutofit fontScale="90000"/>
@@ -14839,7 +14800,7 @@
             <a:picLocks noGrp="1" noChangeAspect="1"/>
           </p:cNvPicPr>
           <p:nvPr>
-            <p:ph idx="1"/>
+            <p:ph idx="4294967295"/>
           </p:nvPr>
         </p:nvPicPr>
         <p:blipFill>
@@ -14850,8 +14811,8 @@
         </p:blipFill>
         <p:spPr>
           <a:xfrm>
-            <a:off x="836612" y="1561514"/>
-            <a:ext cx="10667994" cy="3276599"/>
+            <a:off x="836612" y="2087710"/>
+            <a:ext cx="10668000" cy="3276600"/>
           </a:xfrm>
           <a:prstGeom prst="rect">
             <a:avLst/>
@@ -14916,12 +14877,7 @@
             <p:ph type="title"/>
           </p:nvPr>
         </p:nvSpPr>
-        <p:spPr>
-          <a:xfrm>
-            <a:off x="379412" y="381000"/>
-            <a:ext cx="10971372" cy="1066800"/>
-          </a:xfrm>
-        </p:spPr>
+        <p:spPr/>
         <p:txBody>
           <a:bodyPr>
             <a:normAutofit fontScale="90000"/>
@@ -14963,8 +14919,8 @@
         </p:blipFill>
         <p:spPr>
           <a:xfrm>
-            <a:off x="2589212" y="1454834"/>
-            <a:ext cx="6511583" cy="4341055"/>
+            <a:off x="2817812" y="2184125"/>
+            <a:ext cx="6018213" cy="4012142"/>
           </a:xfrm>
           <a:prstGeom prst="rect">
             <a:avLst/>
@@ -15023,15 +14979,10 @@
             <p:ph type="title"/>
           </p:nvPr>
         </p:nvSpPr>
-        <p:spPr>
-          <a:xfrm>
-            <a:off x="379412" y="533401"/>
-            <a:ext cx="10971372" cy="1066800"/>
-          </a:xfrm>
-        </p:spPr>
+        <p:spPr/>
         <p:txBody>
           <a:bodyPr>
-            <a:normAutofit fontScale="90000"/>
+            <a:normAutofit/>
           </a:bodyPr>
           <a:lstStyle/>
           <a:p>
@@ -15066,8 +15017,8 @@
         </p:blipFill>
         <p:spPr>
           <a:xfrm>
-            <a:off x="1751011" y="1752601"/>
-            <a:ext cx="8234549" cy="4038600"/>
+            <a:off x="2482119" y="2249488"/>
+            <a:ext cx="7221412" cy="3541712"/>
           </a:xfrm>
           <a:prstGeom prst="rect">
             <a:avLst/>
@@ -15126,15 +15077,10 @@
             <p:ph type="title"/>
           </p:nvPr>
         </p:nvSpPr>
-        <p:spPr>
-          <a:xfrm>
-            <a:off x="514714" y="484379"/>
-            <a:ext cx="10971372" cy="1066800"/>
-          </a:xfrm>
-        </p:spPr>
+        <p:spPr/>
         <p:txBody>
           <a:bodyPr>
-            <a:normAutofit fontScale="90000"/>
+            <a:normAutofit/>
           </a:bodyPr>
           <a:lstStyle/>
           <a:p>
@@ -15169,8 +15115,8 @@
         </p:blipFill>
         <p:spPr>
           <a:xfrm>
-            <a:off x="1779721" y="1752600"/>
-            <a:ext cx="8234548" cy="4038600"/>
+            <a:off x="2482119" y="2249488"/>
+            <a:ext cx="7221412" cy="3541712"/>
           </a:xfrm>
           <a:prstGeom prst="rect">
             <a:avLst/>
@@ -15229,15 +15175,10 @@
             <p:ph type="title"/>
           </p:nvPr>
         </p:nvSpPr>
-        <p:spPr>
-          <a:xfrm>
-            <a:off x="1333350" y="255774"/>
-            <a:ext cx="9711183" cy="1210282"/>
-          </a:xfrm>
-        </p:spPr>
+        <p:spPr/>
         <p:txBody>
           <a:bodyPr>
-            <a:normAutofit fontScale="90000"/>
+            <a:normAutofit/>
           </a:bodyPr>
           <a:lstStyle/>
           <a:p>
@@ -15270,7 +15211,7 @@
         </p:blipFill>
         <p:spPr>
           <a:xfrm>
-            <a:off x="4859556" y="1466056"/>
+            <a:off x="4888109" y="1905000"/>
             <a:ext cx="6629400" cy="2101008"/>
           </a:xfrm>
           <a:prstGeom prst="rect">
@@ -15330,7 +15271,7 @@
         </p:blipFill>
         <p:spPr>
           <a:xfrm>
-            <a:off x="672073" y="2195464"/>
+            <a:off x="671316" y="2514600"/>
             <a:ext cx="4114800" cy="2743200"/>
           </a:xfrm>
           <a:prstGeom prst="rect">
@@ -15390,15 +15331,10 @@
             <p:ph type="title"/>
           </p:nvPr>
         </p:nvSpPr>
-        <p:spPr>
-          <a:xfrm>
-            <a:off x="1217613" y="67514"/>
-            <a:ext cx="10058400" cy="1066800"/>
-          </a:xfrm>
-        </p:spPr>
+        <p:spPr/>
         <p:txBody>
           <a:bodyPr>
-            <a:normAutofit fontScale="90000"/>
+            <a:normAutofit/>
           </a:bodyPr>
           <a:lstStyle/>
           <a:p>
@@ -15423,7 +15359,7 @@
         </p:nvSpPr>
         <p:spPr>
           <a:xfrm>
-            <a:off x="1128712" y="5057335"/>
+            <a:off x="1072410" y="5334535"/>
             <a:ext cx="10375899" cy="1477328"/>
           </a:xfrm>
           <a:prstGeom prst="rect">
@@ -15473,10 +15409,10 @@
       </p:sp>
       <p:pic>
         <p:nvPicPr>
-          <p:cNvPr id="8" name="Picture 7">
+          <p:cNvPr id="3" name="Picture 2">
             <a:extLst>
               <a:ext uri="{FF2B5EF4-FFF2-40B4-BE49-F238E27FC236}">
-                <a16:creationId xmlns:a16="http://schemas.microsoft.com/office/drawing/2014/main" id="{98579E71-0B24-480E-896D-2442BE0F3796}"/>
+                <a16:creationId xmlns:a16="http://schemas.microsoft.com/office/drawing/2014/main" id="{10DD3801-EC66-45E2-947A-2FD3F2CD2E85}"/>
               </a:ext>
             </a:extLst>
           </p:cNvPr>
@@ -15493,8 +15429,8 @@
         </p:blipFill>
         <p:spPr>
           <a:xfrm>
-            <a:off x="1216025" y="1306595"/>
-            <a:ext cx="10058400" cy="3541095"/>
+            <a:off x="1231953" y="2097088"/>
+            <a:ext cx="10056812" cy="3017044"/>
           </a:xfrm>
           <a:prstGeom prst="rect">
             <a:avLst/>

</xml_diff>